<commit_message>
added labels to Grays Harbor map
</commit_message>
<xml_diff>
--- a/papers/clawpack-5x/figures/GraysHarbor.pptx
+++ b/papers/clawpack-5x/figures/GraysHarbor.pptx
@@ -3289,6 +3289,110 @@
             <a:r>
               <a:rPr lang="en-US" dirty="0" smtClean="0"/>
               <a:t>(c)</a:t>
+            </a:r>
+            <a:endParaRPr lang="en-US" dirty="0"/>
+          </a:p>
+        </p:txBody>
+      </p:sp>
+      <p:sp>
+        <p:nvSpPr>
+          <p:cNvPr id="5" name="TextBox 4"/>
+          <p:cNvSpPr txBox="1"/>
+          <p:nvPr/>
+        </p:nvSpPr>
+        <p:spPr>
+          <a:xfrm flipH="1">
+            <a:off x="104195" y="2450068"/>
+            <a:ext cx="1102305" cy="369332"/>
+          </a:xfrm>
+          <a:prstGeom prst="rect">
+            <a:avLst/>
+          </a:prstGeom>
+          <a:noFill/>
+        </p:spPr>
+        <p:txBody>
+          <a:bodyPr wrap="square" rtlCol="0">
+            <a:spAutoFit/>
+          </a:bodyPr>
+          <a:lstStyle/>
+          <a:p>
+            <a:r>
+              <a:rPr lang="en-US" dirty="0" smtClean="0"/>
+              <a:t>Westport</a:t>
+            </a:r>
+            <a:endParaRPr lang="en-US" dirty="0"/>
+          </a:p>
+        </p:txBody>
+      </p:sp>
+      <p:sp>
+        <p:nvSpPr>
+          <p:cNvPr id="10" name="Oval 9"/>
+          <p:cNvSpPr/>
+          <p:nvPr/>
+        </p:nvSpPr>
+        <p:spPr>
+          <a:xfrm>
+            <a:off x="1282700" y="2927767"/>
+            <a:ext cx="88900" cy="76299"/>
+          </a:xfrm>
+          <a:prstGeom prst="ellipse">
+            <a:avLst/>
+          </a:prstGeom>
+        </p:spPr>
+        <p:style>
+          <a:lnRef idx="2">
+            <a:schemeClr val="accent2">
+              <a:shade val="50000"/>
+            </a:schemeClr>
+          </a:lnRef>
+          <a:fillRef idx="1">
+            <a:schemeClr val="accent2"/>
+          </a:fillRef>
+          <a:effectRef idx="0">
+            <a:schemeClr val="accent2"/>
+          </a:effectRef>
+          <a:fontRef idx="minor">
+            <a:schemeClr val="lt1"/>
+          </a:fontRef>
+        </p:style>
+        <p:txBody>
+          <a:bodyPr rtlCol="0" anchor="ctr"/>
+          <a:lstStyle/>
+          <a:p>
+            <a:pPr algn="ctr"/>
+            <a:endParaRPr lang="en-US"/>
+          </a:p>
+        </p:txBody>
+      </p:sp>
+      <p:sp>
+        <p:nvSpPr>
+          <p:cNvPr id="11" name="TextBox 10"/>
+          <p:cNvSpPr txBox="1"/>
+          <p:nvPr/>
+        </p:nvSpPr>
+        <p:spPr>
+          <a:xfrm>
+            <a:off x="1371600" y="2743101"/>
+            <a:ext cx="1778000" cy="369332"/>
+          </a:xfrm>
+          <a:prstGeom prst="rect">
+            <a:avLst/>
+          </a:prstGeom>
+          <a:noFill/>
+        </p:spPr>
+        <p:txBody>
+          <a:bodyPr wrap="square" rtlCol="0">
+            <a:spAutoFit/>
+          </a:bodyPr>
+          <a:lstStyle/>
+          <a:p>
+            <a:r>
+              <a:rPr lang="en-US" dirty="0" err="1" smtClean="0"/>
+              <a:t>Ocosta</a:t>
+            </a:r>
+            <a:r>
+              <a:rPr lang="en-US" dirty="0" smtClean="0"/>
+              <a:t> School</a:t>
             </a:r>
             <a:endParaRPr lang="en-US" dirty="0"/>
           </a:p>

</xml_diff>